<commit_message>
Azure Right Info / Entwurf integriertes konzept
</commit_message>
<xml_diff>
--- a/1c. Working with Azure/AccessAzureOverview.pptx
+++ b/1c. Working with Azure/AccessAzureOverview.pptx
@@ -244,7 +244,7 @@
           <a:p>
             <a:fld id="{84BD7C8B-36D3-466B-917C-BF3CFA95D07A}" type="datetimeFigureOut">
               <a:rPr lang="de-DE" smtClean="0"/>
-              <a:t>21.10.2018</a:t>
+              <a:t>25.10.2018</a:t>
             </a:fld>
             <a:endParaRPr lang="de-DE"/>
           </a:p>
@@ -414,7 +414,7 @@
           <a:p>
             <a:fld id="{84BD7C8B-36D3-466B-917C-BF3CFA95D07A}" type="datetimeFigureOut">
               <a:rPr lang="de-DE" smtClean="0"/>
-              <a:t>21.10.2018</a:t>
+              <a:t>25.10.2018</a:t>
             </a:fld>
             <a:endParaRPr lang="de-DE"/>
           </a:p>
@@ -594,7 +594,7 @@
           <a:p>
             <a:fld id="{84BD7C8B-36D3-466B-917C-BF3CFA95D07A}" type="datetimeFigureOut">
               <a:rPr lang="de-DE" smtClean="0"/>
-              <a:t>21.10.2018</a:t>
+              <a:t>25.10.2018</a:t>
             </a:fld>
             <a:endParaRPr lang="de-DE"/>
           </a:p>
@@ -764,7 +764,7 @@
           <a:p>
             <a:fld id="{84BD7C8B-36D3-466B-917C-BF3CFA95D07A}" type="datetimeFigureOut">
               <a:rPr lang="de-DE" smtClean="0"/>
-              <a:t>21.10.2018</a:t>
+              <a:t>25.10.2018</a:t>
             </a:fld>
             <a:endParaRPr lang="de-DE"/>
           </a:p>
@@ -1008,7 +1008,7 @@
           <a:p>
             <a:fld id="{84BD7C8B-36D3-466B-917C-BF3CFA95D07A}" type="datetimeFigureOut">
               <a:rPr lang="de-DE" smtClean="0"/>
-              <a:t>21.10.2018</a:t>
+              <a:t>25.10.2018</a:t>
             </a:fld>
             <a:endParaRPr lang="de-DE"/>
           </a:p>
@@ -1240,7 +1240,7 @@
           <a:p>
             <a:fld id="{84BD7C8B-36D3-466B-917C-BF3CFA95D07A}" type="datetimeFigureOut">
               <a:rPr lang="de-DE" smtClean="0"/>
-              <a:t>21.10.2018</a:t>
+              <a:t>25.10.2018</a:t>
             </a:fld>
             <a:endParaRPr lang="de-DE"/>
           </a:p>
@@ -1607,7 +1607,7 @@
           <a:p>
             <a:fld id="{84BD7C8B-36D3-466B-917C-BF3CFA95D07A}" type="datetimeFigureOut">
               <a:rPr lang="de-DE" smtClean="0"/>
-              <a:t>21.10.2018</a:t>
+              <a:t>25.10.2018</a:t>
             </a:fld>
             <a:endParaRPr lang="de-DE"/>
           </a:p>
@@ -1725,7 +1725,7 @@
           <a:p>
             <a:fld id="{84BD7C8B-36D3-466B-917C-BF3CFA95D07A}" type="datetimeFigureOut">
               <a:rPr lang="de-DE" smtClean="0"/>
-              <a:t>21.10.2018</a:t>
+              <a:t>25.10.2018</a:t>
             </a:fld>
             <a:endParaRPr lang="de-DE"/>
           </a:p>
@@ -1820,7 +1820,7 @@
           <a:p>
             <a:fld id="{84BD7C8B-36D3-466B-917C-BF3CFA95D07A}" type="datetimeFigureOut">
               <a:rPr lang="de-DE" smtClean="0"/>
-              <a:t>21.10.2018</a:t>
+              <a:t>25.10.2018</a:t>
             </a:fld>
             <a:endParaRPr lang="de-DE"/>
           </a:p>
@@ -2097,7 +2097,7 @@
           <a:p>
             <a:fld id="{84BD7C8B-36D3-466B-917C-BF3CFA95D07A}" type="datetimeFigureOut">
               <a:rPr lang="de-DE" smtClean="0"/>
-              <a:t>21.10.2018</a:t>
+              <a:t>25.10.2018</a:t>
             </a:fld>
             <a:endParaRPr lang="de-DE"/>
           </a:p>
@@ -2354,7 +2354,7 @@
           <a:p>
             <a:fld id="{84BD7C8B-36D3-466B-917C-BF3CFA95D07A}" type="datetimeFigureOut">
               <a:rPr lang="de-DE" smtClean="0"/>
-              <a:t>21.10.2018</a:t>
+              <a:t>25.10.2018</a:t>
             </a:fld>
             <a:endParaRPr lang="de-DE"/>
           </a:p>
@@ -2567,7 +2567,7 @@
           <a:p>
             <a:fld id="{84BD7C8B-36D3-466B-917C-BF3CFA95D07A}" type="datetimeFigureOut">
               <a:rPr lang="de-DE" smtClean="0"/>
-              <a:t>21.10.2018</a:t>
+              <a:t>25.10.2018</a:t>
             </a:fld>
             <a:endParaRPr lang="de-DE"/>
           </a:p>
@@ -4682,8 +4682,8 @@
         </p:nvSpPr>
         <p:spPr>
           <a:xfrm>
-            <a:off x="2421539" y="5594714"/>
-            <a:ext cx="1072670" cy="473848"/>
+            <a:off x="1705057" y="5836321"/>
+            <a:ext cx="2351214" cy="321242"/>
           </a:xfrm>
           <a:prstGeom prst="rect">
             <a:avLst/>
@@ -4716,70 +4716,83 @@
           </a:p>
           <a:p>
             <a:r>
-              <a:rPr lang="de-DE" sz="496" dirty="0">
-                <a:solidFill>
-                  <a:schemeClr val="bg1">
-                    <a:lumMod val="50000"/>
-                  </a:schemeClr>
-                </a:solidFill>
-              </a:rPr>
+              <a:rPr lang="de-DE" sz="496" dirty="0"/>
               <a:t>Right Check </a:t>
             </a:r>
             <a:r>
-              <a:rPr lang="de-DE" sz="496" dirty="0" err="1">
-                <a:solidFill>
-                  <a:schemeClr val="bg1">
-                    <a:lumMod val="50000"/>
-                  </a:schemeClr>
-                </a:solidFill>
-              </a:rPr>
-              <a:t>with</a:t>
-            </a:r>
-            <a:r>
-              <a:rPr lang="de-DE" sz="496" dirty="0">
-                <a:solidFill>
-                  <a:schemeClr val="bg1">
-                    <a:lumMod val="50000"/>
-                  </a:schemeClr>
-                </a:solidFill>
-              </a:rPr>
-              <a:t> INNER JOIN </a:t>
-            </a:r>
-            <a:r>
-              <a:rPr lang="de-DE" sz="496" dirty="0" err="1">
-                <a:solidFill>
-                  <a:schemeClr val="bg1">
-                    <a:lumMod val="50000"/>
-                  </a:schemeClr>
-                </a:solidFill>
-              </a:rPr>
+              <a:rPr lang="de-DE" sz="496" dirty="0" err="1"/>
+              <a:t>Stored</a:t>
+            </a:r>
+            <a:r>
+              <a:rPr lang="de-DE" sz="496" dirty="0"/>
+              <a:t> </a:t>
+            </a:r>
+            <a:r>
+              <a:rPr lang="de-DE" sz="496" dirty="0" err="1"/>
+              <a:t>Procedure</a:t>
+            </a:r>
+            <a:r>
+              <a:rPr lang="de-DE" sz="496" dirty="0"/>
+              <a:t>:  </a:t>
+            </a:r>
+            <a:r>
+              <a:rPr lang="de-DE" sz="496" dirty="0" err="1"/>
+              <a:t>Join</a:t>
+            </a:r>
+            <a:r>
+              <a:rPr lang="de-DE" sz="496" dirty="0"/>
+              <a:t> </a:t>
+            </a:r>
+            <a:r>
+              <a:rPr lang="de-DE" sz="496" dirty="0" err="1"/>
               <a:t>sx_pf_vUserRights</a:t>
             </a:r>
             <a:r>
-              <a:rPr lang="de-DE" sz="496" dirty="0">
-                <a:solidFill>
-                  <a:schemeClr val="bg1">
-                    <a:lumMod val="50000"/>
-                  </a:schemeClr>
-                </a:solidFill>
-              </a:rPr>
+              <a:rPr lang="de-DE" sz="496" dirty="0"/>
               <a:t> </a:t>
             </a:r>
             <a:r>
-              <a:rPr lang="de-DE" sz="496" dirty="0" err="1">
-                <a:solidFill>
-                  <a:srgbClr val="FF0000"/>
-                </a:solidFill>
-              </a:rPr>
+              <a:rPr lang="de-DE" sz="496" dirty="0" err="1"/>
               <a:t>over</a:t>
             </a:r>
             <a:r>
-              <a:rPr lang="de-DE" sz="496" dirty="0">
-                <a:solidFill>
-                  <a:srgbClr val="FF0000"/>
-                </a:solidFill>
-              </a:rPr>
-              <a:t> ORIGINAL_LOGIN() ?</a:t>
+              <a:rPr lang="de-DE" sz="496" dirty="0"/>
+              <a:t> @</a:t>
+            </a:r>
+            <a:r>
+              <a:rPr lang="de-DE" sz="496" dirty="0" err="1"/>
+              <a:t>Transactusername</a:t>
+            </a:r>
+            <a:endParaRPr lang="de-DE" sz="496" dirty="0"/>
+          </a:p>
+          <a:p>
+            <a:r>
+              <a:rPr lang="de-DE" sz="496" dirty="0"/>
+              <a:t>Right Check View: </a:t>
+            </a:r>
+            <a:r>
+              <a:rPr lang="de-DE" sz="496" dirty="0" err="1"/>
+              <a:t>Join</a:t>
+            </a:r>
+            <a:r>
+              <a:rPr lang="de-DE" sz="496" dirty="0"/>
+              <a:t> </a:t>
+            </a:r>
+            <a:r>
+              <a:rPr lang="de-DE" sz="496" dirty="0" err="1"/>
+              <a:t>sx_pf_vUserRights</a:t>
+            </a:r>
+            <a:r>
+              <a:rPr lang="de-DE" sz="496" dirty="0"/>
+              <a:t> </a:t>
+            </a:r>
+            <a:r>
+              <a:rPr lang="de-DE" sz="496" dirty="0" err="1"/>
+              <a:t>over</a:t>
+            </a:r>
+            <a:r>
+              <a:rPr lang="de-DE" sz="496" dirty="0"/>
+              <a:t> RIGINAL_LOGIN()</a:t>
             </a:r>
           </a:p>
         </p:txBody>
@@ -5372,14 +5385,12 @@
           </p:cNvPr>
           <p:cNvCxnSpPr>
             <a:cxnSpLocks/>
-            <a:stCxn id="4" idx="4"/>
-            <a:endCxn id="54" idx="1"/>
           </p:cNvCxnSpPr>
           <p:nvPr/>
         </p:nvCxnSpPr>
         <p:spPr>
           <a:xfrm>
-            <a:off x="2605778" y="5220752"/>
+            <a:off x="2552093" y="5227751"/>
             <a:ext cx="2469595" cy="1273833"/>
           </a:xfrm>
           <a:prstGeom prst="line">

</xml_diff>